<commit_message>
Albert er til mænd
</commit_message>
<xml_diff>
--- a/Fremlæggelse/2441.pptx
+++ b/Fremlæggelse/2441.pptx
@@ -7,11 +7,12 @@
   <p:sldIdLst>
     <p:sldId id="256" r:id="rId2"/>
     <p:sldId id="257" r:id="rId3"/>
-    <p:sldId id="258" r:id="rId4"/>
-    <p:sldId id="259" r:id="rId5"/>
-    <p:sldId id="260" r:id="rId6"/>
-    <p:sldId id="262" r:id="rId7"/>
-    <p:sldId id="261" r:id="rId8"/>
+    <p:sldId id="259" r:id="rId4"/>
+    <p:sldId id="263" r:id="rId5"/>
+    <p:sldId id="258" r:id="rId6"/>
+    <p:sldId id="260" r:id="rId7"/>
+    <p:sldId id="262" r:id="rId8"/>
+    <p:sldId id="261" r:id="rId9"/>
   </p:sldIdLst>
   <p:sldSz cx="9144000" cy="6858000" type="screen4x3"/>
   <p:notesSz cx="6858000" cy="9144000"/>
@@ -3701,6 +3702,18 @@
               <a:rPr lang="en-US" dirty="0" err="1" smtClean="0"/>
               <a:t>projektet</a:t>
             </a:r>
+            <a:r>
+              <a:rPr lang="en-US" dirty="0" smtClean="0"/>
+              <a:t> (</a:t>
+            </a:r>
+            <a:r>
+              <a:rPr lang="en-US" dirty="0" err="1" smtClean="0"/>
+              <a:t>Lise</a:t>
+            </a:r>
+            <a:r>
+              <a:rPr lang="en-US" dirty="0" smtClean="0"/>
+              <a:t>)</a:t>
+            </a:r>
             <a:endParaRPr lang="en-US" dirty="0" smtClean="0"/>
           </a:p>
           <a:p>
@@ -3724,22 +3737,6 @@
             <a:r>
               <a:rPr lang="en-US" dirty="0" err="1" smtClean="0"/>
               <a:t>SysML</a:t>
-            </a:r>
-            <a:endParaRPr lang="en-US" dirty="0" smtClean="0"/>
-          </a:p>
-          <a:p>
-            <a:pPr lvl="1"/>
-            <a:r>
-              <a:rPr lang="en-US" dirty="0" err="1" smtClean="0"/>
-              <a:t>Vores</a:t>
-            </a:r>
-            <a:r>
-              <a:rPr lang="en-US" dirty="0" smtClean="0"/>
-              <a:t> </a:t>
-            </a:r>
-            <a:r>
-              <a:rPr lang="en-US" dirty="0" err="1" smtClean="0"/>
-              <a:t>løsning</a:t>
             </a:r>
             <a:endParaRPr lang="en-US" dirty="0" smtClean="0"/>
           </a:p>
@@ -3798,7 +3795,7 @@
           <a:p>
             <a:r>
               <a:rPr lang="en-US" dirty="0" err="1" smtClean="0"/>
-              <a:t>Programmet</a:t>
+              <a:t>Baggrund</a:t>
             </a:r>
             <a:endParaRPr lang="en-US" dirty="0"/>
           </a:p>
@@ -3820,22 +3817,40 @@
           <a:lstStyle/>
           <a:p>
             <a:r>
+              <a:rPr lang="en-US" dirty="0" err="1" smtClean="0"/>
+              <a:t>Teori</a:t>
+            </a:r>
+            <a:r>
               <a:rPr lang="en-US" dirty="0" smtClean="0"/>
-              <a:t>3-lagsmodel</a:t>
-            </a:r>
-          </a:p>
-          <a:p>
+              <a:t> </a:t>
+            </a:r>
             <a:r>
               <a:rPr lang="en-US" dirty="0" err="1" smtClean="0"/>
-              <a:t>Brugergrænseflade</a:t>
+              <a:t>om</a:t>
+            </a:r>
+            <a:r>
+              <a:rPr lang="en-US" dirty="0" smtClean="0"/>
+              <a:t> </a:t>
+            </a:r>
+            <a:r>
+              <a:rPr lang="en-US" dirty="0" err="1" smtClean="0"/>
+              <a:t>atriflimren</a:t>
+            </a:r>
+            <a:r>
+              <a:rPr lang="en-US" dirty="0" smtClean="0"/>
+              <a:t> (Albert)</a:t>
+            </a:r>
+            <a:endParaRPr lang="en-US" dirty="0"/>
+          </a:p>
+          <a:p>
+            <a:pPr lvl="1"/>
+            <a:r>
+              <a:rPr lang="en-US" dirty="0" err="1" smtClean="0"/>
+              <a:t>Detektion</a:t>
             </a:r>
             <a:endParaRPr lang="en-US" dirty="0" smtClean="0"/>
           </a:p>
           <a:p>
-            <a:r>
-              <a:rPr lang="en-US" dirty="0" smtClean="0"/>
-              <a:t>Database</a:t>
-            </a:r>
             <a:endParaRPr lang="en-US" dirty="0"/>
           </a:p>
         </p:txBody>
@@ -3843,7 +3858,7 @@
     </p:spTree>
     <p:extLst>
       <p:ext uri="{BB962C8B-B14F-4D97-AF65-F5344CB8AC3E}">
-        <p14:creationId xmlns:p14="http://schemas.microsoft.com/office/powerpoint/2010/main" val="3771213395"/>
+        <p14:creationId xmlns:p14="http://schemas.microsoft.com/office/powerpoint/2010/main" val="550771762"/>
       </p:ext>
     </p:extLst>
   </p:cSld>
@@ -3887,7 +3902,7 @@
           <a:p>
             <a:r>
               <a:rPr lang="en-US" dirty="0" err="1" smtClean="0"/>
-              <a:t>Baggrund</a:t>
+              <a:t>Algoritme</a:t>
             </a:r>
             <a:endParaRPr lang="en-US" dirty="0"/>
           </a:p>
@@ -3909,36 +3924,9 @@
           <a:lstStyle/>
           <a:p>
             <a:r>
-              <a:rPr lang="en-US" dirty="0" err="1" smtClean="0"/>
-              <a:t>Teori</a:t>
-            </a:r>
-            <a:r>
               <a:rPr lang="en-US" dirty="0" smtClean="0"/>
-              <a:t> </a:t>
-            </a:r>
-            <a:r>
-              <a:rPr lang="en-US" dirty="0" err="1" smtClean="0"/>
-              <a:t>om</a:t>
-            </a:r>
-            <a:r>
-              <a:rPr lang="en-US" dirty="0" smtClean="0"/>
-              <a:t> </a:t>
-            </a:r>
-            <a:r>
-              <a:rPr lang="en-US" dirty="0" err="1" smtClean="0"/>
-              <a:t>atriflimren</a:t>
-            </a:r>
-            <a:endParaRPr lang="en-US" dirty="0"/>
-          </a:p>
-          <a:p>
-            <a:pPr lvl="1"/>
-            <a:r>
-              <a:rPr lang="en-US" dirty="0" err="1" smtClean="0"/>
-              <a:t>Detektion</a:t>
-            </a:r>
-            <a:endParaRPr lang="en-US" dirty="0" smtClean="0"/>
-          </a:p>
-          <a:p>
+              <a:t>(Sara)</a:t>
+            </a:r>
             <a:endParaRPr lang="en-US" dirty="0"/>
           </a:p>
         </p:txBody>
@@ -3946,7 +3934,7 @@
     </p:spTree>
     <p:extLst>
       <p:ext uri="{BB962C8B-B14F-4D97-AF65-F5344CB8AC3E}">
-        <p14:creationId xmlns:p14="http://schemas.microsoft.com/office/powerpoint/2010/main" val="550771762"/>
+        <p14:creationId xmlns:p14="http://schemas.microsoft.com/office/powerpoint/2010/main" val="2951436299"/>
       </p:ext>
     </p:extLst>
   </p:cSld>
@@ -3990,7 +3978,7 @@
           <a:p>
             <a:r>
               <a:rPr lang="en-US" dirty="0" err="1" smtClean="0"/>
-              <a:t>Videreudvilkning</a:t>
+              <a:t>Programmet</a:t>
             </a:r>
             <a:endParaRPr lang="en-US" dirty="0"/>
           </a:p>
@@ -4012,33 +4000,67 @@
           <a:lstStyle/>
           <a:p>
             <a:r>
+              <a:rPr lang="en-US" dirty="0" err="1" smtClean="0"/>
+              <a:t>Demostration</a:t>
+            </a:r>
+            <a:r>
               <a:rPr lang="en-US" dirty="0" smtClean="0"/>
-              <a:t>!</a:t>
+              <a:t> (M</a:t>
+            </a:r>
+            <a:r>
+              <a:rPr lang="en-US" dirty="0" smtClean="0"/>
+              <a:t>a</a:t>
+            </a:r>
+            <a:r>
+              <a:rPr lang="en-US" dirty="0" smtClean="0"/>
+              <a:t>rtin)</a:t>
+            </a:r>
+          </a:p>
+          <a:p>
+            <a:r>
+              <a:rPr lang="en-US" dirty="0" err="1"/>
+              <a:t>Brugergrænseflade</a:t>
+            </a:r>
+            <a:r>
+              <a:rPr lang="en-US" dirty="0"/>
+              <a:t> (Martin)</a:t>
+            </a:r>
+          </a:p>
+          <a:p>
+            <a:r>
+              <a:rPr lang="en-US" dirty="0" smtClean="0"/>
+              <a:t>3</a:t>
+            </a:r>
+            <a:r>
+              <a:rPr lang="en-US" dirty="0" smtClean="0"/>
+              <a:t>-</a:t>
+            </a:r>
+            <a:r>
+              <a:rPr lang="en-US" dirty="0" smtClean="0"/>
+              <a:t>lagsmodel (</a:t>
             </a:r>
             <a:r>
               <a:rPr lang="en-US" dirty="0" err="1" smtClean="0"/>
-              <a:t>Punkterne</a:t>
+              <a:t>Malene</a:t>
             </a:r>
             <a:r>
               <a:rPr lang="en-US" dirty="0" smtClean="0"/>
-              <a:t> </a:t>
-            </a:r>
-            <a:r>
-              <a:rPr lang="en-US" dirty="0" err="1" smtClean="0"/>
-              <a:t>fra</a:t>
-            </a:r>
+              <a:t>)</a:t>
+            </a:r>
+            <a:endParaRPr lang="en-US" dirty="0" smtClean="0"/>
+          </a:p>
+          <a:p>
             <a:r>
               <a:rPr lang="en-US" dirty="0" smtClean="0"/>
-              <a:t> rapport!</a:t>
-            </a:r>
-            <a:endParaRPr lang="en-US" dirty="0"/>
+              <a:t>Database (Mohamed)</a:t>
+            </a:r>
           </a:p>
         </p:txBody>
       </p:sp>
     </p:spTree>
     <p:extLst>
       <p:ext uri="{BB962C8B-B14F-4D97-AF65-F5344CB8AC3E}">
-        <p14:creationId xmlns:p14="http://schemas.microsoft.com/office/powerpoint/2010/main" val="1728565195"/>
+        <p14:creationId xmlns:p14="http://schemas.microsoft.com/office/powerpoint/2010/main" val="3771213395"/>
       </p:ext>
     </p:extLst>
   </p:cSld>
@@ -4082,7 +4104,7 @@
           <a:p>
             <a:r>
               <a:rPr lang="en-US" dirty="0" err="1" smtClean="0"/>
-              <a:t>Arbejdsform</a:t>
+              <a:t>Videreudvilkning</a:t>
             </a:r>
             <a:endParaRPr lang="en-US" dirty="0"/>
           </a:p>
@@ -4104,34 +4126,32 @@
           <a:lstStyle/>
           <a:p>
             <a:r>
+              <a:rPr lang="en-US" dirty="0" smtClean="0"/>
+              <a:t>!</a:t>
+            </a:r>
+            <a:r>
               <a:rPr lang="en-US" dirty="0" err="1" smtClean="0"/>
-              <a:t>Uddelegering</a:t>
-            </a:r>
-            <a:endParaRPr lang="en-US" dirty="0" smtClean="0"/>
-          </a:p>
-          <a:p>
+              <a:t>Punkterne</a:t>
+            </a:r>
+            <a:r>
+              <a:rPr lang="en-US" dirty="0" smtClean="0"/>
+              <a:t> </a:t>
+            </a:r>
             <a:r>
               <a:rPr lang="en-US" dirty="0" err="1" smtClean="0"/>
-              <a:t>Møde</a:t>
-            </a:r>
-            <a:endParaRPr lang="en-US" dirty="0" smtClean="0"/>
-          </a:p>
-          <a:p>
-            <a:pPr lvl="1"/>
-            <a:r>
-              <a:rPr lang="en-US" dirty="0" err="1" smtClean="0"/>
-              <a:t>R</a:t>
-            </a:r>
-            <a:r>
-              <a:rPr lang="en-US" dirty="0" err="1" smtClean="0"/>
-              <a:t>eferat</a:t>
-            </a:r>
-            <a:endParaRPr lang="en-US" dirty="0" smtClean="0"/>
-          </a:p>
-          <a:p>
-            <a:r>
-              <a:rPr lang="en-US" dirty="0" err="1" smtClean="0"/>
-              <a:t>Logbog</a:t>
+              <a:t>fra</a:t>
+            </a:r>
+            <a:r>
+              <a:rPr lang="en-US" dirty="0" smtClean="0"/>
+              <a:t> rapport</a:t>
+            </a:r>
+            <a:r>
+              <a:rPr lang="en-US" dirty="0" smtClean="0"/>
+              <a:t>! </a:t>
+            </a:r>
+            <a:r>
+              <a:rPr lang="en-US" dirty="0" smtClean="0"/>
+              <a:t>(Mads)</a:t>
             </a:r>
             <a:endParaRPr lang="en-US" dirty="0"/>
           </a:p>
@@ -4140,7 +4160,7 @@
     </p:spTree>
     <p:extLst>
       <p:ext uri="{BB962C8B-B14F-4D97-AF65-F5344CB8AC3E}">
-        <p14:creationId xmlns:p14="http://schemas.microsoft.com/office/powerpoint/2010/main" val="2872372720"/>
+        <p14:creationId xmlns:p14="http://schemas.microsoft.com/office/powerpoint/2010/main" val="1728565195"/>
       </p:ext>
     </p:extLst>
   </p:cSld>
@@ -4184,6 +4204,116 @@
           <a:p>
             <a:r>
               <a:rPr lang="en-US" dirty="0" err="1" smtClean="0"/>
+              <a:t>Arbejdsform</a:t>
+            </a:r>
+            <a:endParaRPr lang="en-US" dirty="0"/>
+          </a:p>
+        </p:txBody>
+      </p:sp>
+      <p:sp>
+        <p:nvSpPr>
+          <p:cNvPr id="3" name="Content Placeholder 2"/>
+          <p:cNvSpPr>
+            <a:spLocks noGrp="1"/>
+          </p:cNvSpPr>
+          <p:nvPr>
+            <p:ph idx="1"/>
+          </p:nvPr>
+        </p:nvSpPr>
+        <p:spPr/>
+        <p:txBody>
+          <a:bodyPr/>
+          <a:lstStyle/>
+          <a:p>
+            <a:r>
+              <a:rPr lang="en-US" dirty="0" err="1" smtClean="0"/>
+              <a:t>Uddelegering</a:t>
+            </a:r>
+            <a:r>
+              <a:rPr lang="en-US" dirty="0" smtClean="0"/>
+              <a:t> (</a:t>
+            </a:r>
+            <a:r>
+              <a:rPr lang="en-US" dirty="0" err="1" smtClean="0"/>
+              <a:t>Cecilie</a:t>
+            </a:r>
+            <a:r>
+              <a:rPr lang="en-US" dirty="0" smtClean="0"/>
+              <a:t>)</a:t>
+            </a:r>
+            <a:endParaRPr lang="en-US" dirty="0" smtClean="0"/>
+          </a:p>
+          <a:p>
+            <a:r>
+              <a:rPr lang="en-US" dirty="0" err="1" smtClean="0"/>
+              <a:t>Møde</a:t>
+            </a:r>
+            <a:endParaRPr lang="en-US" dirty="0" smtClean="0"/>
+          </a:p>
+          <a:p>
+            <a:pPr lvl="1"/>
+            <a:r>
+              <a:rPr lang="en-US" dirty="0" err="1" smtClean="0"/>
+              <a:t>Referat</a:t>
+            </a:r>
+            <a:endParaRPr lang="en-US" dirty="0" smtClean="0"/>
+          </a:p>
+          <a:p>
+            <a:r>
+              <a:rPr lang="en-US" dirty="0" err="1" smtClean="0"/>
+              <a:t>Logbog</a:t>
+            </a:r>
+            <a:endParaRPr lang="en-US" dirty="0" smtClean="0"/>
+          </a:p>
+        </p:txBody>
+      </p:sp>
+    </p:spTree>
+    <p:extLst>
+      <p:ext uri="{BB962C8B-B14F-4D97-AF65-F5344CB8AC3E}">
+        <p14:creationId xmlns:p14="http://schemas.microsoft.com/office/powerpoint/2010/main" val="2872372720"/>
+      </p:ext>
+    </p:extLst>
+  </p:cSld>
+  <p:clrMapOvr>
+    <a:masterClrMapping/>
+  </p:clrMapOvr>
+</p:sld>
+</file>
+
+<file path=ppt/slides/slide8.xml><?xml version="1.0" encoding="utf-8"?>
+<p:sld xmlns:a="http://schemas.openxmlformats.org/drawingml/2006/main" xmlns:r="http://schemas.openxmlformats.org/officeDocument/2006/relationships" xmlns:p="http://schemas.openxmlformats.org/presentationml/2006/main">
+  <p:cSld>
+    <p:spTree>
+      <p:nvGrpSpPr>
+        <p:cNvPr id="1" name=""/>
+        <p:cNvGrpSpPr/>
+        <p:nvPr/>
+      </p:nvGrpSpPr>
+      <p:grpSpPr>
+        <a:xfrm>
+          <a:off x="0" y="0"/>
+          <a:ext cx="0" cy="0"/>
+          <a:chOff x="0" y="0"/>
+          <a:chExt cx="0" cy="0"/>
+        </a:xfrm>
+      </p:grpSpPr>
+      <p:sp>
+        <p:nvSpPr>
+          <p:cNvPr id="2" name="Title 1"/>
+          <p:cNvSpPr>
+            <a:spLocks noGrp="1"/>
+          </p:cNvSpPr>
+          <p:nvPr>
+            <p:ph type="title"/>
+          </p:nvPr>
+        </p:nvSpPr>
+        <p:spPr/>
+        <p:txBody>
+          <a:bodyPr/>
+          <a:lstStyle/>
+          <a:p>
+            <a:r>
+              <a:rPr lang="en-US" dirty="0" err="1" smtClean="0"/>
               <a:t>Konklusion</a:t>
             </a:r>
             <a:endParaRPr lang="en-US" dirty="0"/>
@@ -4205,7 +4335,31 @@
           <a:bodyPr/>
           <a:lstStyle/>
           <a:p>
-            <a:endParaRPr lang="en-US"/>
+            <a:r>
+              <a:rPr lang="en-US" dirty="0" smtClean="0"/>
+              <a:t>(</a:t>
+            </a:r>
+            <a:r>
+              <a:rPr lang="en-US" dirty="0" err="1" smtClean="0"/>
+              <a:t>Cecilie+Sara</a:t>
+            </a:r>
+            <a:r>
+              <a:rPr lang="en-US" dirty="0" smtClean="0"/>
+              <a:t>)</a:t>
+            </a:r>
+          </a:p>
+          <a:p>
+            <a:r>
+              <a:rPr lang="en-US" dirty="0" err="1"/>
+              <a:t>Benyttede</a:t>
+            </a:r>
+            <a:r>
+              <a:rPr lang="en-US" dirty="0"/>
+              <a:t> fag</a:t>
+            </a:r>
+          </a:p>
+          <a:p>
+            <a:endParaRPr lang="en-US" dirty="0"/>
           </a:p>
         </p:txBody>
       </p:sp>

</xml_diff>